<commit_message>
Origineel van tekening toegevoegd
</commit_message>
<xml_diff>
--- a/Beroepen/Natuurkunde - Intro & beroepen v0.5.pptx
+++ b/Beroepen/Natuurkunde - Intro & beroepen v0.5.pptx
@@ -309,7 +309,7 @@
             <a:fld id="{8638F0FA-503B-447F-A02E-6BF1D880434F}" type="datetimeFigureOut">
               <a:rPr lang="nl-NL" smtClean="0"/>
               <a:pPr/>
-              <a:t>5-2-2020</a:t>
+              <a:t>2-12-2021</a:t>
             </a:fld>
             <a:endParaRPr lang="nl-NL"/>
           </a:p>
@@ -352,7 +352,7 @@
             <a:fld id="{C3EE7185-A582-4542-8FF0-969B3F80C0A5}" type="slidenum">
               <a:rPr lang="nl-NL" smtClean="0"/>
               <a:pPr/>
-              <a:t>‹nr.›</a:t>
+              <a:t>‹#›</a:t>
             </a:fld>
             <a:endParaRPr lang="nl-NL"/>
           </a:p>
@@ -474,7 +474,7 @@
             <a:fld id="{8638F0FA-503B-447F-A02E-6BF1D880434F}" type="datetimeFigureOut">
               <a:rPr lang="nl-NL" smtClean="0"/>
               <a:pPr/>
-              <a:t>5-2-2020</a:t>
+              <a:t>2-12-2021</a:t>
             </a:fld>
             <a:endParaRPr lang="nl-NL"/>
           </a:p>
@@ -517,7 +517,7 @@
             <a:fld id="{C3EE7185-A582-4542-8FF0-969B3F80C0A5}" type="slidenum">
               <a:rPr lang="nl-NL" smtClean="0"/>
               <a:pPr/>
-              <a:t>‹nr.›</a:t>
+              <a:t>‹#›</a:t>
             </a:fld>
             <a:endParaRPr lang="nl-NL"/>
           </a:p>
@@ -649,7 +649,7 @@
             <a:fld id="{8638F0FA-503B-447F-A02E-6BF1D880434F}" type="datetimeFigureOut">
               <a:rPr lang="nl-NL" smtClean="0"/>
               <a:pPr/>
-              <a:t>5-2-2020</a:t>
+              <a:t>2-12-2021</a:t>
             </a:fld>
             <a:endParaRPr lang="nl-NL"/>
           </a:p>
@@ -692,7 +692,7 @@
             <a:fld id="{C3EE7185-A582-4542-8FF0-969B3F80C0A5}" type="slidenum">
               <a:rPr lang="nl-NL" smtClean="0"/>
               <a:pPr/>
-              <a:t>‹nr.›</a:t>
+              <a:t>‹#›</a:t>
             </a:fld>
             <a:endParaRPr lang="nl-NL"/>
           </a:p>
@@ -814,7 +814,7 @@
             <a:fld id="{8638F0FA-503B-447F-A02E-6BF1D880434F}" type="datetimeFigureOut">
               <a:rPr lang="nl-NL" smtClean="0"/>
               <a:pPr/>
-              <a:t>5-2-2020</a:t>
+              <a:t>2-12-2021</a:t>
             </a:fld>
             <a:endParaRPr lang="nl-NL"/>
           </a:p>
@@ -857,7 +857,7 @@
             <a:fld id="{C3EE7185-A582-4542-8FF0-969B3F80C0A5}" type="slidenum">
               <a:rPr lang="nl-NL" smtClean="0"/>
               <a:pPr/>
-              <a:t>‹nr.›</a:t>
+              <a:t>‹#›</a:t>
             </a:fld>
             <a:endParaRPr lang="nl-NL"/>
           </a:p>
@@ -1056,7 +1056,7 @@
             <a:fld id="{8638F0FA-503B-447F-A02E-6BF1D880434F}" type="datetimeFigureOut">
               <a:rPr lang="nl-NL" smtClean="0"/>
               <a:pPr/>
-              <a:t>5-2-2020</a:t>
+              <a:t>2-12-2021</a:t>
             </a:fld>
             <a:endParaRPr lang="nl-NL"/>
           </a:p>
@@ -1099,7 +1099,7 @@
             <a:fld id="{C3EE7185-A582-4542-8FF0-969B3F80C0A5}" type="slidenum">
               <a:rPr lang="nl-NL" smtClean="0"/>
               <a:pPr/>
-              <a:t>‹nr.›</a:t>
+              <a:t>‹#›</a:t>
             </a:fld>
             <a:endParaRPr lang="nl-NL"/>
           </a:p>
@@ -1338,7 +1338,7 @@
             <a:fld id="{8638F0FA-503B-447F-A02E-6BF1D880434F}" type="datetimeFigureOut">
               <a:rPr lang="nl-NL" smtClean="0"/>
               <a:pPr/>
-              <a:t>5-2-2020</a:t>
+              <a:t>2-12-2021</a:t>
             </a:fld>
             <a:endParaRPr lang="nl-NL"/>
           </a:p>
@@ -1381,7 +1381,7 @@
             <a:fld id="{C3EE7185-A582-4542-8FF0-969B3F80C0A5}" type="slidenum">
               <a:rPr lang="nl-NL" smtClean="0"/>
               <a:pPr/>
-              <a:t>‹nr.›</a:t>
+              <a:t>‹#›</a:t>
             </a:fld>
             <a:endParaRPr lang="nl-NL"/>
           </a:p>
@@ -1754,7 +1754,7 @@
             <a:fld id="{8638F0FA-503B-447F-A02E-6BF1D880434F}" type="datetimeFigureOut">
               <a:rPr lang="nl-NL" smtClean="0"/>
               <a:pPr/>
-              <a:t>5-2-2020</a:t>
+              <a:t>2-12-2021</a:t>
             </a:fld>
             <a:endParaRPr lang="nl-NL"/>
           </a:p>
@@ -1797,7 +1797,7 @@
             <a:fld id="{C3EE7185-A582-4542-8FF0-969B3F80C0A5}" type="slidenum">
               <a:rPr lang="nl-NL" smtClean="0"/>
               <a:pPr/>
-              <a:t>‹nr.›</a:t>
+              <a:t>‹#›</a:t>
             </a:fld>
             <a:endParaRPr lang="nl-NL"/>
           </a:p>
@@ -1868,7 +1868,7 @@
             <a:fld id="{8638F0FA-503B-447F-A02E-6BF1D880434F}" type="datetimeFigureOut">
               <a:rPr lang="nl-NL" smtClean="0"/>
               <a:pPr/>
-              <a:t>5-2-2020</a:t>
+              <a:t>2-12-2021</a:t>
             </a:fld>
             <a:endParaRPr lang="nl-NL"/>
           </a:p>
@@ -1911,7 +1911,7 @@
             <a:fld id="{C3EE7185-A582-4542-8FF0-969B3F80C0A5}" type="slidenum">
               <a:rPr lang="nl-NL" smtClean="0"/>
               <a:pPr/>
-              <a:t>‹nr.›</a:t>
+              <a:t>‹#›</a:t>
             </a:fld>
             <a:endParaRPr lang="nl-NL"/>
           </a:p>
@@ -1960,7 +1960,7 @@
             <a:fld id="{8638F0FA-503B-447F-A02E-6BF1D880434F}" type="datetimeFigureOut">
               <a:rPr lang="nl-NL" smtClean="0"/>
               <a:pPr/>
-              <a:t>5-2-2020</a:t>
+              <a:t>2-12-2021</a:t>
             </a:fld>
             <a:endParaRPr lang="nl-NL"/>
           </a:p>
@@ -2003,7 +2003,7 @@
             <a:fld id="{C3EE7185-A582-4542-8FF0-969B3F80C0A5}" type="slidenum">
               <a:rPr lang="nl-NL" smtClean="0"/>
               <a:pPr/>
-              <a:t>‹nr.›</a:t>
+              <a:t>‹#›</a:t>
             </a:fld>
             <a:endParaRPr lang="nl-NL"/>
           </a:p>
@@ -2232,7 +2232,7 @@
             <a:fld id="{8638F0FA-503B-447F-A02E-6BF1D880434F}" type="datetimeFigureOut">
               <a:rPr lang="nl-NL" smtClean="0"/>
               <a:pPr/>
-              <a:t>5-2-2020</a:t>
+              <a:t>2-12-2021</a:t>
             </a:fld>
             <a:endParaRPr lang="nl-NL"/>
           </a:p>
@@ -2275,7 +2275,7 @@
             <a:fld id="{C3EE7185-A582-4542-8FF0-969B3F80C0A5}" type="slidenum">
               <a:rPr lang="nl-NL" smtClean="0"/>
               <a:pPr/>
-              <a:t>‹nr.›</a:t>
+              <a:t>‹#›</a:t>
             </a:fld>
             <a:endParaRPr lang="nl-NL"/>
           </a:p>
@@ -2481,7 +2481,7 @@
             <a:fld id="{8638F0FA-503B-447F-A02E-6BF1D880434F}" type="datetimeFigureOut">
               <a:rPr lang="nl-NL" smtClean="0"/>
               <a:pPr/>
-              <a:t>5-2-2020</a:t>
+              <a:t>2-12-2021</a:t>
             </a:fld>
             <a:endParaRPr lang="nl-NL"/>
           </a:p>
@@ -2524,7 +2524,7 @@
             <a:fld id="{C3EE7185-A582-4542-8FF0-969B3F80C0A5}" type="slidenum">
               <a:rPr lang="nl-NL" smtClean="0"/>
               <a:pPr/>
-              <a:t>‹nr.›</a:t>
+              <a:t>‹#›</a:t>
             </a:fld>
             <a:endParaRPr lang="nl-NL"/>
           </a:p>
@@ -2689,7 +2689,7 @@
             <a:fld id="{8638F0FA-503B-447F-A02E-6BF1D880434F}" type="datetimeFigureOut">
               <a:rPr lang="nl-NL" smtClean="0"/>
               <a:pPr/>
-              <a:t>5-2-2020</a:t>
+              <a:t>2-12-2021</a:t>
             </a:fld>
             <a:endParaRPr lang="nl-NL"/>
           </a:p>
@@ -2768,7 +2768,7 @@
             <a:fld id="{C3EE7185-A582-4542-8FF0-969B3F80C0A5}" type="slidenum">
               <a:rPr lang="nl-NL" smtClean="0"/>
               <a:pPr/>
-              <a:t>‹nr.›</a:t>
+              <a:t>‹#›</a:t>
             </a:fld>
             <a:endParaRPr lang="nl-NL"/>
           </a:p>
@@ -7841,7 +7841,7 @@
         <p:spPr/>
         <p:txBody>
           <a:bodyPr>
-            <a:normAutofit fontScale="85000" lnSpcReduction="10000"/>
+            <a:normAutofit lnSpcReduction="10000"/>
           </a:bodyPr>
           <a:lstStyle/>
           <a:p>
@@ -7915,15 +7915,9 @@
             <a:endParaRPr lang="en-US" dirty="0"/>
           </a:p>
           <a:p>
-            <a:r>
-              <a:rPr lang="nl-NL" dirty="0">
-                <a:hlinkClick r:id="rId2"/>
-              </a:rPr>
-              <a:t>https://www.youtube.com/watch?v=uecmVepKou8</a:t>
-            </a:r>
-            <a:endParaRPr lang="nl-NL" dirty="0"/>
-          </a:p>
-          <a:p>
+            <a:pPr marL="0" indent="0">
+              <a:buNone/>
+            </a:pPr>
             <a:endParaRPr lang="nl-NL" dirty="0"/>
           </a:p>
           <a:p>

</xml_diff>